<commit_message>
Updated - to be shared
</commit_message>
<xml_diff>
--- a/iSolve-iCount-Hackathon_Solution.pptx
+++ b/iSolve-iCount-Hackathon_Solution.pptx
@@ -6,7 +6,7 @@
     <p:sldMasterId id="2147483663" r:id="rId2"/>
   </p:sldMasterIdLst>
   <p:notesMasterIdLst>
-    <p:notesMasterId r:id="rId27"/>
+    <p:notesMasterId r:id="rId28"/>
   </p:notesMasterIdLst>
   <p:sldIdLst>
     <p:sldId id="266" r:id="rId3"/>
@@ -21,18 +21,19 @@
     <p:sldId id="259" r:id="rId12"/>
     <p:sldId id="270" r:id="rId13"/>
     <p:sldId id="278" r:id="rId14"/>
-    <p:sldId id="267" r:id="rId15"/>
-    <p:sldId id="276" r:id="rId16"/>
-    <p:sldId id="277" r:id="rId17"/>
-    <p:sldId id="284" r:id="rId18"/>
-    <p:sldId id="283" r:id="rId19"/>
-    <p:sldId id="286" r:id="rId20"/>
-    <p:sldId id="287" r:id="rId21"/>
-    <p:sldId id="282" r:id="rId22"/>
-    <p:sldId id="280" r:id="rId23"/>
-    <p:sldId id="281" r:id="rId24"/>
-    <p:sldId id="268" r:id="rId25"/>
-    <p:sldId id="265" r:id="rId26"/>
+    <p:sldId id="290" r:id="rId15"/>
+    <p:sldId id="267" r:id="rId16"/>
+    <p:sldId id="276" r:id="rId17"/>
+    <p:sldId id="277" r:id="rId18"/>
+    <p:sldId id="284" r:id="rId19"/>
+    <p:sldId id="283" r:id="rId20"/>
+    <p:sldId id="286" r:id="rId21"/>
+    <p:sldId id="287" r:id="rId22"/>
+    <p:sldId id="282" r:id="rId23"/>
+    <p:sldId id="280" r:id="rId24"/>
+    <p:sldId id="281" r:id="rId25"/>
+    <p:sldId id="268" r:id="rId26"/>
+    <p:sldId id="265" r:id="rId27"/>
   </p:sldIdLst>
   <p:sldSz cx="12192000" cy="6858000"/>
   <p:notesSz cx="6858000" cy="9144000"/>
@@ -221,7 +222,7 @@
           <a:p>
             <a:fld id="{DD634F6A-6287-4B36-9A95-0F17B3383A7B}" type="datetimeFigureOut">
               <a:rPr lang="en-US" smtClean="0"/>
-              <a:t>6/2/2020</a:t>
+              <a:t>6/3/2020</a:t>
             </a:fld>
             <a:endParaRPr lang="en-US" dirty="0"/>
           </a:p>
@@ -644,7 +645,7 @@
     </p:spTree>
     <p:extLst>
       <p:ext uri="{BB962C8B-B14F-4D97-AF65-F5344CB8AC3E}">
-        <p14:creationId xmlns:p14="http://schemas.microsoft.com/office/powerpoint/2010/main" val="1367908836"/>
+        <p14:creationId xmlns:p14="http://schemas.microsoft.com/office/powerpoint/2010/main" val="196318703"/>
       </p:ext>
     </p:extLst>
   </p:cSld>
@@ -724,7 +725,7 @@
     </p:spTree>
     <p:extLst>
       <p:ext uri="{BB962C8B-B14F-4D97-AF65-F5344CB8AC3E}">
-        <p14:creationId xmlns:p14="http://schemas.microsoft.com/office/powerpoint/2010/main" val="634132662"/>
+        <p14:creationId xmlns:p14="http://schemas.microsoft.com/office/powerpoint/2010/main" val="1367908836"/>
       </p:ext>
     </p:extLst>
   </p:cSld>
@@ -804,7 +805,7 @@
     </p:spTree>
     <p:extLst>
       <p:ext uri="{BB962C8B-B14F-4D97-AF65-F5344CB8AC3E}">
-        <p14:creationId xmlns:p14="http://schemas.microsoft.com/office/powerpoint/2010/main" val="4199056211"/>
+        <p14:creationId xmlns:p14="http://schemas.microsoft.com/office/powerpoint/2010/main" val="634132662"/>
       </p:ext>
     </p:extLst>
   </p:cSld>
@@ -884,7 +885,7 @@
     </p:spTree>
     <p:extLst>
       <p:ext uri="{BB962C8B-B14F-4D97-AF65-F5344CB8AC3E}">
-        <p14:creationId xmlns:p14="http://schemas.microsoft.com/office/powerpoint/2010/main" val="3494701084"/>
+        <p14:creationId xmlns:p14="http://schemas.microsoft.com/office/powerpoint/2010/main" val="4199056211"/>
       </p:ext>
     </p:extLst>
   </p:cSld>
@@ -964,7 +965,7 @@
     </p:spTree>
     <p:extLst>
       <p:ext uri="{BB962C8B-B14F-4D97-AF65-F5344CB8AC3E}">
-        <p14:creationId xmlns:p14="http://schemas.microsoft.com/office/powerpoint/2010/main" val="3373517316"/>
+        <p14:creationId xmlns:p14="http://schemas.microsoft.com/office/powerpoint/2010/main" val="3494701084"/>
       </p:ext>
     </p:extLst>
   </p:cSld>
@@ -1044,7 +1045,7 @@
     </p:spTree>
     <p:extLst>
       <p:ext uri="{BB962C8B-B14F-4D97-AF65-F5344CB8AC3E}">
-        <p14:creationId xmlns:p14="http://schemas.microsoft.com/office/powerpoint/2010/main" val="1133052663"/>
+        <p14:creationId xmlns:p14="http://schemas.microsoft.com/office/powerpoint/2010/main" val="3373517316"/>
       </p:ext>
     </p:extLst>
   </p:cSld>
@@ -1124,6 +1125,86 @@
     </p:spTree>
     <p:extLst>
       <p:ext uri="{BB962C8B-B14F-4D97-AF65-F5344CB8AC3E}">
+        <p14:creationId xmlns:p14="http://schemas.microsoft.com/office/powerpoint/2010/main" val="1133052663"/>
+      </p:ext>
+    </p:extLst>
+  </p:cSld>
+  <p:clrMapOvr>
+    <a:masterClrMapping/>
+  </p:clrMapOvr>
+</p:notes>
+</file>
+
+<file path=ppt/notesSlides/notesSlide17.xml><?xml version="1.0" encoding="utf-8"?>
+<p:notes xmlns:a="http://schemas.openxmlformats.org/drawingml/2006/main" xmlns:r="http://schemas.openxmlformats.org/officeDocument/2006/relationships" xmlns:p="http://schemas.openxmlformats.org/presentationml/2006/main">
+  <p:cSld>
+    <p:spTree>
+      <p:nvGrpSpPr>
+        <p:cNvPr id="1" name=""/>
+        <p:cNvGrpSpPr/>
+        <p:nvPr/>
+      </p:nvGrpSpPr>
+      <p:grpSpPr>
+        <a:xfrm>
+          <a:off x="0" y="0"/>
+          <a:ext cx="0" cy="0"/>
+          <a:chOff x="0" y="0"/>
+          <a:chExt cx="0" cy="0"/>
+        </a:xfrm>
+      </p:grpSpPr>
+      <p:sp>
+        <p:nvSpPr>
+          <p:cNvPr id="378" name="Shape 378"/>
+          <p:cNvSpPr>
+            <a:spLocks noGrp="1" noRot="1" noChangeAspect="1"/>
+          </p:cNvSpPr>
+          <p:nvPr>
+            <p:ph type="sldImg"/>
+          </p:nvPr>
+        </p:nvSpPr>
+        <p:spPr>
+          <a:xfrm>
+            <a:off x="381000" y="685800"/>
+            <a:ext cx="6096000" cy="3429000"/>
+          </a:xfrm>
+          <a:prstGeom prst="rect">
+            <a:avLst/>
+          </a:prstGeom>
+        </p:spPr>
+        <p:txBody>
+          <a:bodyPr/>
+          <a:lstStyle/>
+          <a:p>
+            <a:endParaRPr dirty="0"/>
+          </a:p>
+        </p:txBody>
+      </p:sp>
+      <p:sp>
+        <p:nvSpPr>
+          <p:cNvPr id="379" name="Shape 379"/>
+          <p:cNvSpPr>
+            <a:spLocks noGrp="1"/>
+          </p:cNvSpPr>
+          <p:nvPr>
+            <p:ph type="body" sz="quarter" idx="1"/>
+          </p:nvPr>
+        </p:nvSpPr>
+        <p:spPr>
+          <a:prstGeom prst="rect">
+            <a:avLst/>
+          </a:prstGeom>
+        </p:spPr>
+        <p:txBody>
+          <a:bodyPr/>
+          <a:lstStyle/>
+          <a:p>
+            <a:endParaRPr dirty="0"/>
+          </a:p>
+        </p:txBody>
+      </p:sp>
+    </p:spTree>
+    <p:extLst>
+      <p:ext uri="{BB962C8B-B14F-4D97-AF65-F5344CB8AC3E}">
         <p14:creationId xmlns:p14="http://schemas.microsoft.com/office/powerpoint/2010/main" val="3597264339"/>
       </p:ext>
     </p:extLst>
@@ -1134,7 +1215,7 @@
 </p:notes>
 </file>
 
-<file path=ppt/notesSlides/notesSlide17.xml><?xml version="1.0" encoding="utf-8"?>
+<file path=ppt/notesSlides/notesSlide18.xml><?xml version="1.0" encoding="utf-8"?>
 <p:notes xmlns:a="http://schemas.openxmlformats.org/drawingml/2006/main" xmlns:r="http://schemas.openxmlformats.org/officeDocument/2006/relationships" xmlns:p="http://schemas.openxmlformats.org/presentationml/2006/main">
   <p:cSld>
     <p:spTree>
@@ -1684,7 +1765,7 @@
     </p:spTree>
     <p:extLst>
       <p:ext uri="{BB962C8B-B14F-4D97-AF65-F5344CB8AC3E}">
-        <p14:creationId xmlns:p14="http://schemas.microsoft.com/office/powerpoint/2010/main" val="2191341808"/>
+        <p14:creationId xmlns:p14="http://schemas.microsoft.com/office/powerpoint/2010/main" val="2823529793"/>
       </p:ext>
     </p:extLst>
   </p:cSld>
@@ -1764,7 +1845,7 @@
     </p:spTree>
     <p:extLst>
       <p:ext uri="{BB962C8B-B14F-4D97-AF65-F5344CB8AC3E}">
-        <p14:creationId xmlns:p14="http://schemas.microsoft.com/office/powerpoint/2010/main" val="503305178"/>
+        <p14:creationId xmlns:p14="http://schemas.microsoft.com/office/powerpoint/2010/main" val="2191341808"/>
       </p:ext>
     </p:extLst>
   </p:cSld>
@@ -1844,7 +1925,7 @@
     </p:spTree>
     <p:extLst>
       <p:ext uri="{BB962C8B-B14F-4D97-AF65-F5344CB8AC3E}">
-        <p14:creationId xmlns:p14="http://schemas.microsoft.com/office/powerpoint/2010/main" val="196318703"/>
+        <p14:creationId xmlns:p14="http://schemas.microsoft.com/office/powerpoint/2010/main" val="503305178"/>
       </p:ext>
     </p:extLst>
   </p:cSld>
@@ -1983,7 +2064,7 @@
           <a:p>
             <a:fld id="{4417404F-2166-4BB4-87AF-2DF1DBD94F21}" type="datetimeFigureOut">
               <a:rPr lang="en-US" smtClean="0"/>
-              <a:t>6/2/2020</a:t>
+              <a:t>6/3/2020</a:t>
             </a:fld>
             <a:endParaRPr lang="en-US" dirty="0"/>
           </a:p>
@@ -2151,7 +2232,7 @@
           <a:p>
             <a:fld id="{4417404F-2166-4BB4-87AF-2DF1DBD94F21}" type="datetimeFigureOut">
               <a:rPr lang="en-US" smtClean="0"/>
-              <a:t>6/2/2020</a:t>
+              <a:t>6/3/2020</a:t>
             </a:fld>
             <a:endParaRPr lang="en-US" dirty="0"/>
           </a:p>
@@ -2329,7 +2410,7 @@
           <a:p>
             <a:fld id="{4417404F-2166-4BB4-87AF-2DF1DBD94F21}" type="datetimeFigureOut">
               <a:rPr lang="en-US" smtClean="0"/>
-              <a:t>6/2/2020</a:t>
+              <a:t>6/3/2020</a:t>
             </a:fld>
             <a:endParaRPr lang="en-US" dirty="0"/>
           </a:p>
@@ -4045,7 +4126,7 @@
           <a:p>
             <a:fld id="{379A628B-A5BE-42DB-8D82-5ACECE545EE2}" type="datetimeFigureOut">
               <a:rPr lang="en-US" smtClean="0"/>
-              <a:t>6/2/2020</a:t>
+              <a:t>6/3/2020</a:t>
             </a:fld>
             <a:endParaRPr lang="en-US" dirty="0"/>
           </a:p>
@@ -4213,7 +4294,7 @@
           <a:p>
             <a:fld id="{379A628B-A5BE-42DB-8D82-5ACECE545EE2}" type="datetimeFigureOut">
               <a:rPr lang="en-US" smtClean="0"/>
-              <a:t>6/2/2020</a:t>
+              <a:t>6/3/2020</a:t>
             </a:fld>
             <a:endParaRPr lang="en-US" dirty="0"/>
           </a:p>
@@ -4458,7 +4539,7 @@
           <a:p>
             <a:fld id="{379A628B-A5BE-42DB-8D82-5ACECE545EE2}" type="datetimeFigureOut">
               <a:rPr lang="en-US" smtClean="0"/>
-              <a:t>6/2/2020</a:t>
+              <a:t>6/3/2020</a:t>
             </a:fld>
             <a:endParaRPr lang="en-US" dirty="0"/>
           </a:p>
@@ -4687,7 +4768,7 @@
           <a:p>
             <a:fld id="{379A628B-A5BE-42DB-8D82-5ACECE545EE2}" type="datetimeFigureOut">
               <a:rPr lang="en-US" smtClean="0"/>
-              <a:t>6/2/2020</a:t>
+              <a:t>6/3/2020</a:t>
             </a:fld>
             <a:endParaRPr lang="en-US" dirty="0"/>
           </a:p>
@@ -5051,7 +5132,7 @@
           <a:p>
             <a:fld id="{379A628B-A5BE-42DB-8D82-5ACECE545EE2}" type="datetimeFigureOut">
               <a:rPr lang="en-US" smtClean="0"/>
-              <a:t>6/2/2020</a:t>
+              <a:t>6/3/2020</a:t>
             </a:fld>
             <a:endParaRPr lang="en-US" dirty="0"/>
           </a:p>
@@ -5168,7 +5249,7 @@
           <a:p>
             <a:fld id="{379A628B-A5BE-42DB-8D82-5ACECE545EE2}" type="datetimeFigureOut">
               <a:rPr lang="en-US" smtClean="0"/>
-              <a:t>6/2/2020</a:t>
+              <a:t>6/3/2020</a:t>
             </a:fld>
             <a:endParaRPr lang="en-US" dirty="0"/>
           </a:p>
@@ -5336,7 +5417,7 @@
           <a:p>
             <a:fld id="{4417404F-2166-4BB4-87AF-2DF1DBD94F21}" type="datetimeFigureOut">
               <a:rPr lang="en-US" smtClean="0"/>
-              <a:t>6/2/2020</a:t>
+              <a:t>6/3/2020</a:t>
             </a:fld>
             <a:endParaRPr lang="en-US" dirty="0"/>
           </a:p>
@@ -5431,7 +5512,7 @@
           <a:p>
             <a:fld id="{379A628B-A5BE-42DB-8D82-5ACECE545EE2}" type="datetimeFigureOut">
               <a:rPr lang="en-US" smtClean="0"/>
-              <a:t>6/2/2020</a:t>
+              <a:t>6/3/2020</a:t>
             </a:fld>
             <a:endParaRPr lang="en-US" dirty="0"/>
           </a:p>
@@ -5706,7 +5787,7 @@
           <a:p>
             <a:fld id="{379A628B-A5BE-42DB-8D82-5ACECE545EE2}" type="datetimeFigureOut">
               <a:rPr lang="en-US" smtClean="0"/>
-              <a:t>6/2/2020</a:t>
+              <a:t>6/3/2020</a:t>
             </a:fld>
             <a:endParaRPr lang="en-US" dirty="0"/>
           </a:p>
@@ -5958,7 +6039,7 @@
           <a:p>
             <a:fld id="{379A628B-A5BE-42DB-8D82-5ACECE545EE2}" type="datetimeFigureOut">
               <a:rPr lang="en-US" smtClean="0"/>
-              <a:t>6/2/2020</a:t>
+              <a:t>6/3/2020</a:t>
             </a:fld>
             <a:endParaRPr lang="en-US" dirty="0"/>
           </a:p>
@@ -6126,7 +6207,7 @@
           <a:p>
             <a:fld id="{379A628B-A5BE-42DB-8D82-5ACECE545EE2}" type="datetimeFigureOut">
               <a:rPr lang="en-US" smtClean="0"/>
-              <a:t>6/2/2020</a:t>
+              <a:t>6/3/2020</a:t>
             </a:fld>
             <a:endParaRPr lang="en-US" dirty="0"/>
           </a:p>
@@ -6304,7 +6385,7 @@
           <a:p>
             <a:fld id="{379A628B-A5BE-42DB-8D82-5ACECE545EE2}" type="datetimeFigureOut">
               <a:rPr lang="en-US" smtClean="0"/>
-              <a:t>6/2/2020</a:t>
+              <a:t>6/3/2020</a:t>
             </a:fld>
             <a:endParaRPr lang="en-US" dirty="0"/>
           </a:p>
@@ -10700,7 +10781,7 @@
           <a:p>
             <a:fld id="{4417404F-2166-4BB4-87AF-2DF1DBD94F21}" type="datetimeFigureOut">
               <a:rPr lang="en-US" smtClean="0"/>
-              <a:t>6/2/2020</a:t>
+              <a:t>6/3/2020</a:t>
             </a:fld>
             <a:endParaRPr lang="en-US" dirty="0"/>
           </a:p>
@@ -12112,7 +12193,7 @@
           <a:p>
             <a:fld id="{4417404F-2166-4BB4-87AF-2DF1DBD94F21}" type="datetimeFigureOut">
               <a:rPr lang="en-US" smtClean="0"/>
-              <a:t>6/2/2020</a:t>
+              <a:t>6/3/2020</a:t>
             </a:fld>
             <a:endParaRPr lang="en-US" dirty="0"/>
           </a:p>
@@ -12476,7 +12557,7 @@
           <a:p>
             <a:fld id="{4417404F-2166-4BB4-87AF-2DF1DBD94F21}" type="datetimeFigureOut">
               <a:rPr lang="en-US" smtClean="0"/>
-              <a:t>6/2/2020</a:t>
+              <a:t>6/3/2020</a:t>
             </a:fld>
             <a:endParaRPr lang="en-US" dirty="0"/>
           </a:p>
@@ -12593,7 +12674,7 @@
           <a:p>
             <a:fld id="{4417404F-2166-4BB4-87AF-2DF1DBD94F21}" type="datetimeFigureOut">
               <a:rPr lang="en-US" smtClean="0"/>
-              <a:t>6/2/2020</a:t>
+              <a:t>6/3/2020</a:t>
             </a:fld>
             <a:endParaRPr lang="en-US" dirty="0"/>
           </a:p>
@@ -12688,7 +12769,7 @@
           <a:p>
             <a:fld id="{4417404F-2166-4BB4-87AF-2DF1DBD94F21}" type="datetimeFigureOut">
               <a:rPr lang="en-US" smtClean="0"/>
-              <a:t>6/2/2020</a:t>
+              <a:t>6/3/2020</a:t>
             </a:fld>
             <a:endParaRPr lang="en-US" dirty="0"/>
           </a:p>
@@ -12963,7 +13044,7 @@
           <a:p>
             <a:fld id="{4417404F-2166-4BB4-87AF-2DF1DBD94F21}" type="datetimeFigureOut">
               <a:rPr lang="en-US" smtClean="0"/>
-              <a:t>6/2/2020</a:t>
+              <a:t>6/3/2020</a:t>
             </a:fld>
             <a:endParaRPr lang="en-US" dirty="0"/>
           </a:p>
@@ -13215,7 +13296,7 @@
           <a:p>
             <a:fld id="{4417404F-2166-4BB4-87AF-2DF1DBD94F21}" type="datetimeFigureOut">
               <a:rPr lang="en-US" smtClean="0"/>
-              <a:t>6/2/2020</a:t>
+              <a:t>6/3/2020</a:t>
             </a:fld>
             <a:endParaRPr lang="en-US" dirty="0"/>
           </a:p>
@@ -13426,7 +13507,7 @@
           <a:p>
             <a:fld id="{4417404F-2166-4BB4-87AF-2DF1DBD94F21}" type="datetimeFigureOut">
               <a:rPr lang="en-US" smtClean="0"/>
-              <a:t>6/2/2020</a:t>
+              <a:t>6/3/2020</a:t>
             </a:fld>
             <a:endParaRPr lang="en-US" dirty="0"/>
           </a:p>
@@ -13966,7 +14047,7 @@
           <a:p>
             <a:fld id="{379A628B-A5BE-42DB-8D82-5ACECE545EE2}" type="datetimeFigureOut">
               <a:rPr lang="en-US" smtClean="0"/>
-              <a:t>6/2/2020</a:t>
+              <a:t>6/3/2020</a:t>
             </a:fld>
             <a:endParaRPr lang="en-US" dirty="0"/>
           </a:p>
@@ -15086,12 +15167,12 @@
         <p:spPr>
           <a:xfrm>
             <a:off x="183464" y="804333"/>
-            <a:ext cx="11744612" cy="5651885"/>
+            <a:ext cx="11744612" cy="5853315"/>
           </a:xfrm>
         </p:spPr>
         <p:txBody>
           <a:bodyPr>
-            <a:normAutofit/>
+            <a:normAutofit fontScale="92500" lnSpcReduction="20000"/>
           </a:bodyPr>
           <a:lstStyle/>
           <a:p>
@@ -15173,6 +15254,94 @@
               </a:rPr>
               <a:t>outlook-connector</a:t>
             </a:r>
+          </a:p>
+          <a:p>
+            <a:pPr marL="873563" lvl="1" indent="-285750">
+              <a:buFontTx/>
+              <a:buChar char="-"/>
+            </a:pPr>
+            <a:endParaRPr lang="en-US" b="1" dirty="0">
+              <a:solidFill>
+                <a:srgbClr val="007DC3"/>
+              </a:solidFill>
+              <a:latin typeface="+mn-lt"/>
+            </a:endParaRPr>
+          </a:p>
+          <a:p>
+            <a:pPr marL="587813" lvl="1" indent="0">
+              <a:buNone/>
+            </a:pPr>
+            <a:r>
+              <a:rPr lang="en-US" dirty="0">
+                <a:solidFill>
+                  <a:srgbClr val="007DC3"/>
+                </a:solidFill>
+                <a:highlight>
+                  <a:srgbClr val="FFFF00"/>
+                </a:highlight>
+                <a:latin typeface="+mn-lt"/>
+              </a:rPr>
+              <a:t>In the below screenshot we are searching for keyword which is parameterized (Certification/Award/Appreciation etc.. and moving that mails to icount application under relevant goal category, if the category is not part of goals then under additional documents section the mails would be uploaded.</a:t>
+            </a:r>
+          </a:p>
+          <a:p>
+            <a:pPr marL="587813" lvl="1" indent="0">
+              <a:buNone/>
+            </a:pPr>
+            <a:endParaRPr lang="en-US" b="1" dirty="0">
+              <a:solidFill>
+                <a:srgbClr val="007DC3"/>
+              </a:solidFill>
+              <a:latin typeface="+mn-lt"/>
+            </a:endParaRPr>
+          </a:p>
+          <a:p>
+            <a:pPr marL="873563" lvl="1" indent="-285750">
+              <a:buFontTx/>
+              <a:buChar char="-"/>
+            </a:pPr>
+            <a:endParaRPr lang="en-US" b="1" dirty="0">
+              <a:solidFill>
+                <a:srgbClr val="007DC3"/>
+              </a:solidFill>
+              <a:latin typeface="+mn-lt"/>
+            </a:endParaRPr>
+          </a:p>
+          <a:p>
+            <a:pPr marL="873563" lvl="1" indent="-285750">
+              <a:buFontTx/>
+              <a:buChar char="-"/>
+            </a:pPr>
+            <a:endParaRPr lang="en-US" b="1" dirty="0">
+              <a:solidFill>
+                <a:srgbClr val="007DC3"/>
+              </a:solidFill>
+              <a:latin typeface="+mn-lt"/>
+            </a:endParaRPr>
+          </a:p>
+          <a:p>
+            <a:pPr marL="873563" lvl="1" indent="-285750">
+              <a:buFontTx/>
+              <a:buChar char="-"/>
+            </a:pPr>
+            <a:endParaRPr lang="en-US" b="1" dirty="0">
+              <a:solidFill>
+                <a:srgbClr val="007DC3"/>
+              </a:solidFill>
+              <a:latin typeface="+mn-lt"/>
+            </a:endParaRPr>
+          </a:p>
+          <a:p>
+            <a:pPr marL="873563" lvl="1" indent="-285750">
+              <a:buFontTx/>
+              <a:buChar char="-"/>
+            </a:pPr>
+            <a:endParaRPr lang="en-US" b="1" dirty="0">
+              <a:solidFill>
+                <a:srgbClr val="007DC3"/>
+              </a:solidFill>
+              <a:latin typeface="+mn-lt"/>
+            </a:endParaRPr>
           </a:p>
           <a:p>
             <a:pPr marL="587813" lvl="1" indent="0">
@@ -15480,7 +15649,7 @@
         </p:blipFill>
         <p:spPr>
           <a:xfrm>
-            <a:off x="798314" y="2126472"/>
+            <a:off x="758084" y="2843924"/>
             <a:ext cx="10595372" cy="3311120"/>
           </a:xfrm>
           <a:prstGeom prst="rect">
@@ -15553,6 +15722,421 @@
                 <a:latin typeface="+mn-lt"/>
                 <a:sym typeface="Calibri"/>
               </a:rPr>
+              <a:t>Technical Solution – Contd..</a:t>
+            </a:r>
+          </a:p>
+        </p:txBody>
+      </p:sp>
+      <p:sp>
+        <p:nvSpPr>
+          <p:cNvPr id="2" name="Text Placeholder 1"/>
+          <p:cNvSpPr>
+            <a:spLocks noGrp="1"/>
+          </p:cNvSpPr>
+          <p:nvPr>
+            <p:ph type="body" sz="quarter" idx="10"/>
+          </p:nvPr>
+        </p:nvSpPr>
+        <p:spPr>
+          <a:xfrm>
+            <a:off x="183464" y="956603"/>
+            <a:ext cx="11744612" cy="5499615"/>
+          </a:xfrm>
+        </p:spPr>
+        <p:txBody>
+          <a:bodyPr>
+            <a:normAutofit/>
+          </a:bodyPr>
+          <a:lstStyle/>
+          <a:p>
+            <a:pPr marL="587813" lvl="1" indent="0">
+              <a:buNone/>
+            </a:pPr>
+            <a:r>
+              <a:rPr lang="en-US" b="1" dirty="0">
+                <a:solidFill>
+                  <a:srgbClr val="007DC3"/>
+                </a:solidFill>
+                <a:highlight>
+                  <a:srgbClr val="FFFF00"/>
+                </a:highlight>
+              </a:rPr>
+              <a:t>In the below screenshot we are searching for keyword which is parameterized (Certification/Award/Appreciation etc.. and moving that mails to icount application under relevant goal category, if the category is not part of goals then under additional documents section the mails would be uploaded.</a:t>
+            </a:r>
+          </a:p>
+          <a:p>
+            <a:pPr marL="587813" lvl="1" indent="0">
+              <a:buNone/>
+            </a:pPr>
+            <a:endParaRPr lang="en-US" dirty="0">
+              <a:solidFill>
+                <a:srgbClr val="007DC3"/>
+              </a:solidFill>
+              <a:latin typeface="+mn-lt"/>
+            </a:endParaRPr>
+          </a:p>
+          <a:p>
+            <a:pPr marL="587813" lvl="1" indent="0">
+              <a:buNone/>
+            </a:pPr>
+            <a:r>
+              <a:rPr lang="en-US" dirty="0">
+                <a:solidFill>
+                  <a:srgbClr val="007DC3"/>
+                </a:solidFill>
+                <a:latin typeface="+mn-lt"/>
+              </a:rPr>
+              <a:t>In the screenshot below we are moving mails with Certification keyword.</a:t>
+            </a:r>
+          </a:p>
+          <a:p>
+            <a:pPr marL="587813" lvl="1" indent="0">
+              <a:buNone/>
+            </a:pPr>
+            <a:endParaRPr lang="en-US" dirty="0">
+              <a:solidFill>
+                <a:srgbClr val="007DC3"/>
+              </a:solidFill>
+              <a:latin typeface="+mn-lt"/>
+            </a:endParaRPr>
+          </a:p>
+          <a:p>
+            <a:pPr marL="770693" lvl="1" indent="-182880"/>
+            <a:endParaRPr lang="en-US" dirty="0">
+              <a:solidFill>
+                <a:srgbClr val="007DC3"/>
+              </a:solidFill>
+              <a:latin typeface="+mn-lt"/>
+            </a:endParaRPr>
+          </a:p>
+          <a:p>
+            <a:pPr marL="770693" lvl="1" indent="-182880"/>
+            <a:endParaRPr lang="en-US" dirty="0">
+              <a:solidFill>
+                <a:srgbClr val="007DC3"/>
+              </a:solidFill>
+              <a:latin typeface="+mn-lt"/>
+            </a:endParaRPr>
+          </a:p>
+          <a:p>
+            <a:pPr marL="770693" lvl="1" indent="-182880"/>
+            <a:endParaRPr lang="en-US" dirty="0">
+              <a:solidFill>
+                <a:srgbClr val="007DC3"/>
+              </a:solidFill>
+              <a:latin typeface="+mn-lt"/>
+            </a:endParaRPr>
+          </a:p>
+          <a:p>
+            <a:pPr marL="770693" lvl="1" indent="-182880"/>
+            <a:endParaRPr lang="en-US" dirty="0">
+              <a:solidFill>
+                <a:srgbClr val="007DC3"/>
+              </a:solidFill>
+              <a:latin typeface="+mn-lt"/>
+            </a:endParaRPr>
+          </a:p>
+          <a:p>
+            <a:pPr marL="770693" lvl="1" indent="-182880"/>
+            <a:endParaRPr lang="en-US" dirty="0">
+              <a:solidFill>
+                <a:srgbClr val="007DC3"/>
+              </a:solidFill>
+              <a:latin typeface="+mn-lt"/>
+            </a:endParaRPr>
+          </a:p>
+          <a:p>
+            <a:pPr marL="770693" lvl="1" indent="-182880"/>
+            <a:endParaRPr lang="en-US" dirty="0">
+              <a:solidFill>
+                <a:srgbClr val="007DC3"/>
+              </a:solidFill>
+              <a:latin typeface="+mn-lt"/>
+            </a:endParaRPr>
+          </a:p>
+          <a:p>
+            <a:pPr marL="770693" lvl="1" indent="-182880"/>
+            <a:endParaRPr lang="en-US" dirty="0">
+              <a:solidFill>
+                <a:srgbClr val="007DC3"/>
+              </a:solidFill>
+              <a:latin typeface="+mn-lt"/>
+            </a:endParaRPr>
+          </a:p>
+          <a:p>
+            <a:pPr marL="770693" lvl="1" indent="-182880"/>
+            <a:endParaRPr lang="en-US" dirty="0">
+              <a:solidFill>
+                <a:srgbClr val="007DC3"/>
+              </a:solidFill>
+              <a:latin typeface="+mn-lt"/>
+            </a:endParaRPr>
+          </a:p>
+          <a:p>
+            <a:pPr marL="770693" lvl="1" indent="-182880"/>
+            <a:endParaRPr lang="en-US" dirty="0">
+              <a:solidFill>
+                <a:srgbClr val="007DC3"/>
+              </a:solidFill>
+              <a:latin typeface="+mn-lt"/>
+            </a:endParaRPr>
+          </a:p>
+          <a:p>
+            <a:pPr marL="770693" lvl="1" indent="-182880"/>
+            <a:endParaRPr lang="en-US" dirty="0">
+              <a:solidFill>
+                <a:srgbClr val="007DC3"/>
+              </a:solidFill>
+              <a:latin typeface="+mn-lt"/>
+            </a:endParaRPr>
+          </a:p>
+          <a:p>
+            <a:pPr marL="587813" lvl="1" indent="0">
+              <a:buNone/>
+            </a:pPr>
+            <a:r>
+              <a:rPr lang="en-US" dirty="0">
+                <a:solidFill>
+                  <a:srgbClr val="007DC3"/>
+                </a:solidFill>
+                <a:latin typeface="+mn-lt"/>
+              </a:rPr>
+              <a:t>- Appreciation and Feedback can be captured using UI as well. The links will be shared via </a:t>
+            </a:r>
+            <a:r>
+              <a:rPr lang="en-US" dirty="0" err="1">
+                <a:solidFill>
+                  <a:srgbClr val="007DC3"/>
+                </a:solidFill>
+                <a:latin typeface="+mn-lt"/>
+              </a:rPr>
+              <a:t>todo</a:t>
+            </a:r>
+            <a:r>
+              <a:rPr lang="en-US" dirty="0">
+                <a:solidFill>
+                  <a:srgbClr val="007DC3"/>
+                </a:solidFill>
+                <a:latin typeface="+mn-lt"/>
+              </a:rPr>
+              <a:t>-notification emails.</a:t>
+            </a:r>
+          </a:p>
+          <a:p>
+            <a:pPr marL="770693" lvl="1" indent="-182880"/>
+            <a:endParaRPr lang="en-US" dirty="0">
+              <a:solidFill>
+                <a:srgbClr val="007DC3"/>
+              </a:solidFill>
+              <a:latin typeface="+mn-lt"/>
+            </a:endParaRPr>
+          </a:p>
+          <a:p>
+            <a:pPr marL="770693" lvl="1" indent="-182880"/>
+            <a:endParaRPr lang="en-US" dirty="0">
+              <a:solidFill>
+                <a:srgbClr val="007DC3"/>
+              </a:solidFill>
+              <a:latin typeface="+mn-lt"/>
+            </a:endParaRPr>
+          </a:p>
+          <a:p>
+            <a:pPr marL="770693" lvl="1" indent="-182880"/>
+            <a:endParaRPr lang="en-US" dirty="0">
+              <a:solidFill>
+                <a:srgbClr val="007DC3"/>
+              </a:solidFill>
+              <a:latin typeface="+mn-lt"/>
+            </a:endParaRPr>
+          </a:p>
+          <a:p>
+            <a:pPr marL="770693" lvl="1" indent="-182880"/>
+            <a:endParaRPr lang="en-US" dirty="0">
+              <a:solidFill>
+                <a:srgbClr val="007DC3"/>
+              </a:solidFill>
+              <a:latin typeface="+mn-lt"/>
+            </a:endParaRPr>
+          </a:p>
+          <a:p>
+            <a:pPr marL="770693" lvl="1" indent="-182880"/>
+            <a:endParaRPr lang="en-US" dirty="0">
+              <a:solidFill>
+                <a:srgbClr val="007DC3"/>
+              </a:solidFill>
+              <a:latin typeface="+mn-lt"/>
+            </a:endParaRPr>
+          </a:p>
+          <a:p>
+            <a:pPr marL="770693" lvl="1" indent="-182880"/>
+            <a:endParaRPr lang="en-US" dirty="0">
+              <a:solidFill>
+                <a:srgbClr val="007DC3"/>
+              </a:solidFill>
+              <a:latin typeface="+mn-lt"/>
+            </a:endParaRPr>
+          </a:p>
+          <a:p>
+            <a:pPr marL="770693" lvl="1" indent="-182880"/>
+            <a:endParaRPr lang="en-US" dirty="0">
+              <a:solidFill>
+                <a:srgbClr val="007DC3"/>
+              </a:solidFill>
+              <a:latin typeface="+mn-lt"/>
+            </a:endParaRPr>
+          </a:p>
+          <a:p>
+            <a:pPr marL="770693" lvl="1" indent="-182880"/>
+            <a:endParaRPr lang="en-US" dirty="0">
+              <a:solidFill>
+                <a:srgbClr val="007DC3"/>
+              </a:solidFill>
+              <a:latin typeface="+mn-lt"/>
+            </a:endParaRPr>
+          </a:p>
+          <a:p>
+            <a:pPr marL="770693" lvl="1" indent="-182880"/>
+            <a:endParaRPr lang="en-US" dirty="0">
+              <a:solidFill>
+                <a:srgbClr val="007DC3"/>
+              </a:solidFill>
+              <a:latin typeface="+mn-lt"/>
+            </a:endParaRPr>
+          </a:p>
+          <a:p>
+            <a:pPr marL="770693" lvl="1" indent="-182880"/>
+            <a:endParaRPr lang="en-US" dirty="0">
+              <a:solidFill>
+                <a:srgbClr val="007DC3"/>
+              </a:solidFill>
+              <a:latin typeface="+mn-lt"/>
+            </a:endParaRPr>
+          </a:p>
+          <a:p>
+            <a:pPr marL="770693" lvl="1" indent="-182880"/>
+            <a:endParaRPr lang="en-US" dirty="0">
+              <a:solidFill>
+                <a:srgbClr val="007DC3"/>
+              </a:solidFill>
+              <a:latin typeface="+mn-lt"/>
+            </a:endParaRPr>
+          </a:p>
+          <a:p>
+            <a:pPr marL="0" indent="0">
+              <a:buNone/>
+            </a:pPr>
+            <a:endParaRPr lang="en-US" sz="1600" dirty="0">
+              <a:solidFill>
+                <a:srgbClr val="007DC3"/>
+              </a:solidFill>
+              <a:latin typeface="+mn-lt"/>
+            </a:endParaRPr>
+          </a:p>
+          <a:p>
+            <a:pPr marL="0" indent="0">
+              <a:buNone/>
+            </a:pPr>
+            <a:endParaRPr lang="en-US" sz="1600" dirty="0">
+              <a:solidFill>
+                <a:srgbClr val="007DC3"/>
+              </a:solidFill>
+              <a:latin typeface="+mn-lt"/>
+            </a:endParaRPr>
+          </a:p>
+          <a:p>
+            <a:pPr marL="0" indent="0">
+              <a:buNone/>
+            </a:pPr>
+            <a:endParaRPr lang="en-US" sz="1600" dirty="0">
+              <a:solidFill>
+                <a:srgbClr val="007DC3"/>
+              </a:solidFill>
+              <a:latin typeface="+mn-lt"/>
+            </a:endParaRPr>
+          </a:p>
+        </p:txBody>
+      </p:sp>
+      <p:pic>
+        <p:nvPicPr>
+          <p:cNvPr id="3" name="Picture 2">
+            <a:extLst>
+              <a:ext uri="{FF2B5EF4-FFF2-40B4-BE49-F238E27FC236}">
+                <a16:creationId xmlns:a16="http://schemas.microsoft.com/office/drawing/2014/main" id="{5084AF2D-8EC8-4F96-A0E9-B9F8F6605366}"/>
+              </a:ext>
+            </a:extLst>
+          </p:cNvPr>
+          <p:cNvPicPr>
+            <a:picLocks noChangeAspect="1"/>
+          </p:cNvPicPr>
+          <p:nvPr/>
+        </p:nvPicPr>
+        <p:blipFill>
+          <a:blip r:embed="rId3"/>
+          <a:stretch>
+            <a:fillRect/>
+          </a:stretch>
+        </p:blipFill>
+        <p:spPr>
+          <a:xfrm>
+            <a:off x="869853" y="2299116"/>
+            <a:ext cx="10890738" cy="4309372"/>
+          </a:xfrm>
+          <a:prstGeom prst="rect">
+            <a:avLst/>
+          </a:prstGeom>
+        </p:spPr>
+      </p:pic>
+    </p:spTree>
+    <p:extLst>
+      <p:ext uri="{BB962C8B-B14F-4D97-AF65-F5344CB8AC3E}">
+        <p14:creationId xmlns:p14="http://schemas.microsoft.com/office/powerpoint/2010/main" val="3222964644"/>
+      </p:ext>
+    </p:extLst>
+  </p:cSld>
+  <p:clrMapOvr>
+    <a:masterClrMapping/>
+  </p:clrMapOvr>
+  <p:transition spd="med"/>
+</p:sld>
+</file>
+
+<file path=ppt/slides/slide14.xml><?xml version="1.0" encoding="utf-8"?>
+<p:sld xmlns:a="http://schemas.openxmlformats.org/drawingml/2006/main" xmlns:r="http://schemas.openxmlformats.org/officeDocument/2006/relationships" xmlns:p="http://schemas.openxmlformats.org/presentationml/2006/main">
+  <p:cSld>
+    <p:spTree>
+      <p:nvGrpSpPr>
+        <p:cNvPr id="1" name=""/>
+        <p:cNvGrpSpPr/>
+        <p:nvPr/>
+      </p:nvGrpSpPr>
+      <p:grpSpPr>
+        <a:xfrm>
+          <a:off x="0" y="0"/>
+          <a:ext cx="0" cy="0"/>
+          <a:chOff x="0" y="0"/>
+          <a:chExt cx="0" cy="0"/>
+        </a:xfrm>
+      </p:grpSpPr>
+      <p:sp>
+        <p:nvSpPr>
+          <p:cNvPr id="374" name="Shape 374"/>
+          <p:cNvSpPr>
+            <a:spLocks noGrp="1"/>
+          </p:cNvSpPr>
+          <p:nvPr>
+            <p:ph type="title"/>
+          </p:nvPr>
+        </p:nvSpPr>
+        <p:spPr/>
+        <p:txBody>
+          <a:bodyPr/>
+          <a:lstStyle/>
+          <a:p>
+            <a:r>
+              <a:rPr lang="en-US" sz="2700" dirty="0">
+                <a:latin typeface="+mn-lt"/>
+                <a:sym typeface="Calibri"/>
+              </a:rPr>
               <a:t>Technical Solution Continued…</a:t>
             </a:r>
           </a:p>
@@ -16309,7 +16893,7 @@
 </p:sld>
 </file>
 
-<file path=ppt/slides/slide14.xml><?xml version="1.0" encoding="utf-8"?>
+<file path=ppt/slides/slide15.xml><?xml version="1.0" encoding="utf-8"?>
 <p:sld xmlns:a="http://schemas.openxmlformats.org/drawingml/2006/main" xmlns:r="http://schemas.openxmlformats.org/officeDocument/2006/relationships" xmlns:p="http://schemas.openxmlformats.org/presentationml/2006/main">
   <p:cSld>
     <p:spTree>
@@ -16665,7 +17249,7 @@
 </p:sld>
 </file>
 
-<file path=ppt/slides/slide15.xml><?xml version="1.0" encoding="utf-8"?>
+<file path=ppt/slides/slide16.xml><?xml version="1.0" encoding="utf-8"?>
 <p:sld xmlns:a="http://schemas.openxmlformats.org/drawingml/2006/main" xmlns:r="http://schemas.openxmlformats.org/officeDocument/2006/relationships" xmlns:p="http://schemas.openxmlformats.org/presentationml/2006/main">
   <p:cSld>
     <p:bg>
@@ -17126,7 +17710,7 @@
 </p:sld>
 </file>
 
-<file path=ppt/slides/slide16.xml><?xml version="1.0" encoding="utf-8"?>
+<file path=ppt/slides/slide17.xml><?xml version="1.0" encoding="utf-8"?>
 <p:sld xmlns:a="http://schemas.openxmlformats.org/drawingml/2006/main" xmlns:r="http://schemas.openxmlformats.org/officeDocument/2006/relationships" xmlns:p="http://schemas.openxmlformats.org/presentationml/2006/main">
   <p:cSld>
     <p:spTree>
@@ -17648,7 +18232,7 @@
 </p:sld>
 </file>
 
-<file path=ppt/slides/slide17.xml><?xml version="1.0" encoding="utf-8"?>
+<file path=ppt/slides/slide18.xml><?xml version="1.0" encoding="utf-8"?>
 <p:sld xmlns:a="http://schemas.openxmlformats.org/drawingml/2006/main" xmlns:r="http://schemas.openxmlformats.org/officeDocument/2006/relationships" xmlns:p="http://schemas.openxmlformats.org/presentationml/2006/main">
   <p:cSld>
     <p:spTree>
@@ -18134,7 +18718,7 @@
 </p:sld>
 </file>
 
-<file path=ppt/slides/slide18.xml><?xml version="1.0" encoding="utf-8"?>
+<file path=ppt/slides/slide19.xml><?xml version="1.0" encoding="utf-8"?>
 <p:sld xmlns:a="http://schemas.openxmlformats.org/drawingml/2006/main" xmlns:r="http://schemas.openxmlformats.org/officeDocument/2006/relationships" xmlns:p="http://schemas.openxmlformats.org/presentationml/2006/main">
   <p:cSld>
     <p:spTree>
@@ -18546,433 +19130,6 @@
     <p:extLst>
       <p:ext uri="{BB962C8B-B14F-4D97-AF65-F5344CB8AC3E}">
         <p14:creationId xmlns:p14="http://schemas.microsoft.com/office/powerpoint/2010/main" val="683306777"/>
-      </p:ext>
-    </p:extLst>
-  </p:cSld>
-  <p:clrMapOvr>
-    <a:masterClrMapping/>
-  </p:clrMapOvr>
-  <p:transition spd="med"/>
-</p:sld>
-</file>
-
-<file path=ppt/slides/slide19.xml><?xml version="1.0" encoding="utf-8"?>
-<p:sld xmlns:a="http://schemas.openxmlformats.org/drawingml/2006/main" xmlns:r="http://schemas.openxmlformats.org/officeDocument/2006/relationships" xmlns:p="http://schemas.openxmlformats.org/presentationml/2006/main">
-  <p:cSld>
-    <p:spTree>
-      <p:nvGrpSpPr>
-        <p:cNvPr id="1" name=""/>
-        <p:cNvGrpSpPr/>
-        <p:nvPr/>
-      </p:nvGrpSpPr>
-      <p:grpSpPr>
-        <a:xfrm>
-          <a:off x="0" y="0"/>
-          <a:ext cx="0" cy="0"/>
-          <a:chOff x="0" y="0"/>
-          <a:chExt cx="0" cy="0"/>
-        </a:xfrm>
-      </p:grpSpPr>
-      <p:sp>
-        <p:nvSpPr>
-          <p:cNvPr id="374" name="Shape 374"/>
-          <p:cNvSpPr>
-            <a:spLocks noGrp="1"/>
-          </p:cNvSpPr>
-          <p:nvPr>
-            <p:ph type="title"/>
-          </p:nvPr>
-        </p:nvSpPr>
-        <p:spPr>
-          <a:xfrm>
-            <a:off x="263924" y="0"/>
-            <a:ext cx="11630733" cy="401781"/>
-          </a:xfrm>
-        </p:spPr>
-        <p:txBody>
-          <a:bodyPr/>
-          <a:lstStyle/>
-          <a:p>
-            <a:r>
-              <a:rPr lang="en-US" sz="2700" dirty="0">
-                <a:latin typeface="+mn-lt"/>
-                <a:sym typeface="Calibri"/>
-              </a:rPr>
-              <a:t>Technical Solution Continued…</a:t>
-            </a:r>
-          </a:p>
-        </p:txBody>
-      </p:sp>
-      <p:sp>
-        <p:nvSpPr>
-          <p:cNvPr id="2" name="Text Placeholder 1"/>
-          <p:cNvSpPr>
-            <a:spLocks noGrp="1"/>
-          </p:cNvSpPr>
-          <p:nvPr>
-            <p:ph type="body" sz="quarter" idx="10"/>
-          </p:nvPr>
-        </p:nvSpPr>
-        <p:spPr>
-          <a:xfrm>
-            <a:off x="263924" y="512618"/>
-            <a:ext cx="11664152" cy="5943601"/>
-          </a:xfrm>
-        </p:spPr>
-        <p:txBody>
-          <a:bodyPr>
-            <a:normAutofit/>
-          </a:bodyPr>
-          <a:lstStyle/>
-          <a:p>
-            <a:pPr marL="587813" lvl="1" indent="0">
-              <a:buNone/>
-            </a:pPr>
-            <a:r>
-              <a:rPr lang="en-US" sz="1800" dirty="0">
-                <a:solidFill>
-                  <a:srgbClr val="002060"/>
-                </a:solidFill>
-              </a:rPr>
-              <a:t>Leadership/Velocity dashboard is visible to the reviewers</a:t>
-            </a:r>
-          </a:p>
-          <a:p>
-            <a:pPr marL="587813" lvl="1" indent="0">
-              <a:buNone/>
-            </a:pPr>
-            <a:endParaRPr lang="en-US" dirty="0"/>
-          </a:p>
-          <a:p>
-            <a:pPr marL="587813" lvl="1" indent="0">
-              <a:buNone/>
-            </a:pPr>
-            <a:r>
-              <a:rPr lang="en-US" dirty="0"/>
-              <a:t> </a:t>
-            </a:r>
-          </a:p>
-          <a:p>
-            <a:pPr marL="587813" lvl="1" indent="0">
-              <a:buNone/>
-            </a:pPr>
-            <a:endParaRPr lang="en-US" dirty="0">
-              <a:solidFill>
-                <a:srgbClr val="007DC3"/>
-              </a:solidFill>
-            </a:endParaRPr>
-          </a:p>
-          <a:p>
-            <a:pPr marL="587813" lvl="1" indent="0">
-              <a:buNone/>
-            </a:pPr>
-            <a:endParaRPr lang="en-US" dirty="0">
-              <a:solidFill>
-                <a:srgbClr val="007DC3"/>
-              </a:solidFill>
-            </a:endParaRPr>
-          </a:p>
-          <a:p>
-            <a:pPr marL="587813" lvl="1" indent="0">
-              <a:buNone/>
-            </a:pPr>
-            <a:endParaRPr lang="en-US" dirty="0">
-              <a:solidFill>
-                <a:srgbClr val="007DC3"/>
-              </a:solidFill>
-            </a:endParaRPr>
-          </a:p>
-          <a:p>
-            <a:pPr marL="587813" lvl="1" indent="0">
-              <a:buNone/>
-            </a:pPr>
-            <a:endParaRPr lang="en-US" dirty="0">
-              <a:solidFill>
-                <a:srgbClr val="007DC3"/>
-              </a:solidFill>
-              <a:latin typeface="+mn-lt"/>
-            </a:endParaRPr>
-          </a:p>
-          <a:p>
-            <a:pPr marL="587813" lvl="1" indent="0">
-              <a:buNone/>
-            </a:pPr>
-            <a:endParaRPr lang="en-US" dirty="0">
-              <a:solidFill>
-                <a:srgbClr val="007DC3"/>
-              </a:solidFill>
-              <a:latin typeface="+mn-lt"/>
-            </a:endParaRPr>
-          </a:p>
-          <a:p>
-            <a:pPr marL="770693" lvl="1" indent="-182880"/>
-            <a:endParaRPr lang="en-US" dirty="0">
-              <a:solidFill>
-                <a:srgbClr val="007DC3"/>
-              </a:solidFill>
-              <a:latin typeface="+mn-lt"/>
-            </a:endParaRPr>
-          </a:p>
-          <a:p>
-            <a:pPr marL="770693" lvl="1" indent="-182880"/>
-            <a:endParaRPr lang="en-US" dirty="0">
-              <a:solidFill>
-                <a:srgbClr val="007DC3"/>
-              </a:solidFill>
-              <a:latin typeface="+mn-lt"/>
-            </a:endParaRPr>
-          </a:p>
-          <a:p>
-            <a:pPr marL="770693" lvl="1" indent="-182880"/>
-            <a:endParaRPr lang="en-US" dirty="0">
-              <a:solidFill>
-                <a:srgbClr val="007DC3"/>
-              </a:solidFill>
-              <a:latin typeface="+mn-lt"/>
-            </a:endParaRPr>
-          </a:p>
-          <a:p>
-            <a:pPr marL="770693" lvl="1" indent="-182880"/>
-            <a:endParaRPr lang="en-US" dirty="0">
-              <a:solidFill>
-                <a:srgbClr val="007DC3"/>
-              </a:solidFill>
-              <a:latin typeface="+mn-lt"/>
-            </a:endParaRPr>
-          </a:p>
-          <a:p>
-            <a:pPr marL="770693" lvl="1" indent="-182880"/>
-            <a:endParaRPr lang="en-US" dirty="0">
-              <a:solidFill>
-                <a:srgbClr val="007DC3"/>
-              </a:solidFill>
-              <a:latin typeface="+mn-lt"/>
-            </a:endParaRPr>
-          </a:p>
-          <a:p>
-            <a:pPr marL="770693" lvl="1" indent="-182880"/>
-            <a:endParaRPr lang="en-US" dirty="0">
-              <a:solidFill>
-                <a:srgbClr val="007DC3"/>
-              </a:solidFill>
-              <a:latin typeface="+mn-lt"/>
-            </a:endParaRPr>
-          </a:p>
-          <a:p>
-            <a:pPr marL="770693" lvl="1" indent="-182880"/>
-            <a:endParaRPr lang="en-US" dirty="0">
-              <a:solidFill>
-                <a:srgbClr val="007DC3"/>
-              </a:solidFill>
-              <a:latin typeface="+mn-lt"/>
-            </a:endParaRPr>
-          </a:p>
-          <a:p>
-            <a:pPr marL="770693" lvl="1" indent="-182880"/>
-            <a:endParaRPr lang="en-US" dirty="0">
-              <a:solidFill>
-                <a:srgbClr val="007DC3"/>
-              </a:solidFill>
-              <a:latin typeface="+mn-lt"/>
-            </a:endParaRPr>
-          </a:p>
-          <a:p>
-            <a:pPr marL="770693" lvl="1" indent="-182880"/>
-            <a:endParaRPr lang="en-US" dirty="0">
-              <a:solidFill>
-                <a:srgbClr val="007DC3"/>
-              </a:solidFill>
-              <a:latin typeface="+mn-lt"/>
-            </a:endParaRPr>
-          </a:p>
-          <a:p>
-            <a:pPr marL="770693" lvl="1" indent="-182880"/>
-            <a:endParaRPr lang="en-US" dirty="0">
-              <a:solidFill>
-                <a:srgbClr val="007DC3"/>
-              </a:solidFill>
-              <a:latin typeface="+mn-lt"/>
-            </a:endParaRPr>
-          </a:p>
-          <a:p>
-            <a:pPr marL="770693" lvl="1" indent="-182880"/>
-            <a:endParaRPr lang="en-US" dirty="0">
-              <a:solidFill>
-                <a:srgbClr val="007DC3"/>
-              </a:solidFill>
-              <a:latin typeface="+mn-lt"/>
-            </a:endParaRPr>
-          </a:p>
-          <a:p>
-            <a:pPr marL="770693" lvl="1" indent="-182880"/>
-            <a:endParaRPr lang="en-US" dirty="0">
-              <a:solidFill>
-                <a:srgbClr val="007DC3"/>
-              </a:solidFill>
-              <a:latin typeface="+mn-lt"/>
-            </a:endParaRPr>
-          </a:p>
-          <a:p>
-            <a:pPr marL="770693" lvl="1" indent="-182880"/>
-            <a:endParaRPr lang="en-US" dirty="0">
-              <a:solidFill>
-                <a:srgbClr val="007DC3"/>
-              </a:solidFill>
-              <a:latin typeface="+mn-lt"/>
-            </a:endParaRPr>
-          </a:p>
-          <a:p>
-            <a:pPr marL="770693" lvl="1" indent="-182880"/>
-            <a:endParaRPr lang="en-US" dirty="0">
-              <a:solidFill>
-                <a:srgbClr val="007DC3"/>
-              </a:solidFill>
-              <a:latin typeface="+mn-lt"/>
-            </a:endParaRPr>
-          </a:p>
-          <a:p>
-            <a:pPr marL="770693" lvl="1" indent="-182880"/>
-            <a:endParaRPr lang="en-US" dirty="0">
-              <a:solidFill>
-                <a:srgbClr val="007DC3"/>
-              </a:solidFill>
-              <a:latin typeface="+mn-lt"/>
-            </a:endParaRPr>
-          </a:p>
-          <a:p>
-            <a:pPr marL="770693" lvl="1" indent="-182880"/>
-            <a:endParaRPr lang="en-US" dirty="0">
-              <a:solidFill>
-                <a:srgbClr val="007DC3"/>
-              </a:solidFill>
-              <a:latin typeface="+mn-lt"/>
-            </a:endParaRPr>
-          </a:p>
-          <a:p>
-            <a:pPr marL="770693" lvl="1" indent="-182880"/>
-            <a:endParaRPr lang="en-US" dirty="0">
-              <a:solidFill>
-                <a:srgbClr val="007DC3"/>
-              </a:solidFill>
-              <a:latin typeface="+mn-lt"/>
-            </a:endParaRPr>
-          </a:p>
-          <a:p>
-            <a:pPr marL="770693" lvl="1" indent="-182880"/>
-            <a:endParaRPr lang="en-US" dirty="0">
-              <a:solidFill>
-                <a:srgbClr val="007DC3"/>
-              </a:solidFill>
-              <a:latin typeface="+mn-lt"/>
-            </a:endParaRPr>
-          </a:p>
-          <a:p>
-            <a:pPr marL="770693" lvl="1" indent="-182880"/>
-            <a:endParaRPr lang="en-US" dirty="0">
-              <a:solidFill>
-                <a:srgbClr val="007DC3"/>
-              </a:solidFill>
-              <a:latin typeface="+mn-lt"/>
-            </a:endParaRPr>
-          </a:p>
-          <a:p>
-            <a:pPr marL="770693" lvl="1" indent="-182880"/>
-            <a:endParaRPr lang="en-US" dirty="0">
-              <a:solidFill>
-                <a:srgbClr val="007DC3"/>
-              </a:solidFill>
-              <a:latin typeface="+mn-lt"/>
-            </a:endParaRPr>
-          </a:p>
-          <a:p>
-            <a:pPr marL="0" indent="0">
-              <a:buNone/>
-            </a:pPr>
-            <a:endParaRPr lang="en-US" sz="1600" dirty="0">
-              <a:solidFill>
-                <a:srgbClr val="007DC3"/>
-              </a:solidFill>
-              <a:latin typeface="+mn-lt"/>
-            </a:endParaRPr>
-          </a:p>
-          <a:p>
-            <a:pPr marL="0" indent="0">
-              <a:buNone/>
-            </a:pPr>
-            <a:endParaRPr lang="en-US" sz="1600" dirty="0">
-              <a:solidFill>
-                <a:srgbClr val="007DC3"/>
-              </a:solidFill>
-              <a:latin typeface="+mn-lt"/>
-            </a:endParaRPr>
-          </a:p>
-          <a:p>
-            <a:pPr marL="0" indent="0">
-              <a:buNone/>
-            </a:pPr>
-            <a:endParaRPr lang="en-US" sz="1600" dirty="0">
-              <a:solidFill>
-                <a:srgbClr val="007DC3"/>
-              </a:solidFill>
-              <a:latin typeface="+mn-lt"/>
-            </a:endParaRPr>
-          </a:p>
-        </p:txBody>
-      </p:sp>
-      <p:pic>
-        <p:nvPicPr>
-          <p:cNvPr id="4" name="Picture 3">
-            <a:extLst>
-              <a:ext uri="{FF2B5EF4-FFF2-40B4-BE49-F238E27FC236}">
-                <a16:creationId xmlns:a16="http://schemas.microsoft.com/office/drawing/2014/main" id="{6661837B-3119-444F-A9CA-3197DD0C0DE1}"/>
-              </a:ext>
-            </a:extLst>
-          </p:cNvPr>
-          <p:cNvPicPr>
-            <a:picLocks noChangeAspect="1"/>
-          </p:cNvPicPr>
-          <p:nvPr/>
-        </p:nvPicPr>
-        <p:blipFill>
-          <a:blip r:embed="rId3">
-            <a:extLst>
-              <a:ext uri="{28A0092B-C50C-407E-A947-70E740481C1C}">
-                <a14:useLocalDpi xmlns:a14="http://schemas.microsoft.com/office/drawing/2010/main" val="0"/>
-              </a:ext>
-            </a:extLst>
-          </a:blip>
-          <a:stretch>
-            <a:fillRect/>
-          </a:stretch>
-        </p:blipFill>
-        <p:spPr>
-          <a:xfrm>
-            <a:off x="416324" y="887726"/>
-            <a:ext cx="10681167" cy="5082547"/>
-          </a:xfrm>
-          <a:prstGeom prst="rect">
-            <a:avLst/>
-          </a:prstGeom>
-        </p:spPr>
-        <p:style>
-          <a:lnRef idx="2">
-            <a:schemeClr val="dk1"/>
-          </a:lnRef>
-          <a:fillRef idx="1">
-            <a:schemeClr val="lt1"/>
-          </a:fillRef>
-          <a:effectRef idx="0">
-            <a:schemeClr val="dk1"/>
-          </a:effectRef>
-          <a:fontRef idx="minor">
-            <a:schemeClr val="dk1"/>
-          </a:fontRef>
-        </p:style>
-      </p:pic>
-    </p:spTree>
-    <p:extLst>
-      <p:ext uri="{BB962C8B-B14F-4D97-AF65-F5344CB8AC3E}">
-        <p14:creationId xmlns:p14="http://schemas.microsoft.com/office/powerpoint/2010/main" val="673954294"/>
       </p:ext>
     </p:extLst>
   </p:cSld>
@@ -20461,6 +20618,433 @@
             <p:ph type="title"/>
           </p:nvPr>
         </p:nvSpPr>
+        <p:spPr>
+          <a:xfrm>
+            <a:off x="263924" y="0"/>
+            <a:ext cx="11630733" cy="401781"/>
+          </a:xfrm>
+        </p:spPr>
+        <p:txBody>
+          <a:bodyPr/>
+          <a:lstStyle/>
+          <a:p>
+            <a:r>
+              <a:rPr lang="en-US" sz="2700" dirty="0">
+                <a:latin typeface="+mn-lt"/>
+                <a:sym typeface="Calibri"/>
+              </a:rPr>
+              <a:t>Technical Solution Continued…</a:t>
+            </a:r>
+          </a:p>
+        </p:txBody>
+      </p:sp>
+      <p:sp>
+        <p:nvSpPr>
+          <p:cNvPr id="2" name="Text Placeholder 1"/>
+          <p:cNvSpPr>
+            <a:spLocks noGrp="1"/>
+          </p:cNvSpPr>
+          <p:nvPr>
+            <p:ph type="body" sz="quarter" idx="10"/>
+          </p:nvPr>
+        </p:nvSpPr>
+        <p:spPr>
+          <a:xfrm>
+            <a:off x="263924" y="512618"/>
+            <a:ext cx="11664152" cy="5943601"/>
+          </a:xfrm>
+        </p:spPr>
+        <p:txBody>
+          <a:bodyPr>
+            <a:normAutofit/>
+          </a:bodyPr>
+          <a:lstStyle/>
+          <a:p>
+            <a:pPr marL="587813" lvl="1" indent="0">
+              <a:buNone/>
+            </a:pPr>
+            <a:r>
+              <a:rPr lang="en-US" sz="1800" dirty="0">
+                <a:solidFill>
+                  <a:srgbClr val="002060"/>
+                </a:solidFill>
+              </a:rPr>
+              <a:t>Leadership/Velocity dashboard is visible to the reviewers</a:t>
+            </a:r>
+          </a:p>
+          <a:p>
+            <a:pPr marL="587813" lvl="1" indent="0">
+              <a:buNone/>
+            </a:pPr>
+            <a:endParaRPr lang="en-US" dirty="0"/>
+          </a:p>
+          <a:p>
+            <a:pPr marL="587813" lvl="1" indent="0">
+              <a:buNone/>
+            </a:pPr>
+            <a:r>
+              <a:rPr lang="en-US" dirty="0"/>
+              <a:t> </a:t>
+            </a:r>
+          </a:p>
+          <a:p>
+            <a:pPr marL="587813" lvl="1" indent="0">
+              <a:buNone/>
+            </a:pPr>
+            <a:endParaRPr lang="en-US" dirty="0">
+              <a:solidFill>
+                <a:srgbClr val="007DC3"/>
+              </a:solidFill>
+            </a:endParaRPr>
+          </a:p>
+          <a:p>
+            <a:pPr marL="587813" lvl="1" indent="0">
+              <a:buNone/>
+            </a:pPr>
+            <a:endParaRPr lang="en-US" dirty="0">
+              <a:solidFill>
+                <a:srgbClr val="007DC3"/>
+              </a:solidFill>
+            </a:endParaRPr>
+          </a:p>
+          <a:p>
+            <a:pPr marL="587813" lvl="1" indent="0">
+              <a:buNone/>
+            </a:pPr>
+            <a:endParaRPr lang="en-US" dirty="0">
+              <a:solidFill>
+                <a:srgbClr val="007DC3"/>
+              </a:solidFill>
+            </a:endParaRPr>
+          </a:p>
+          <a:p>
+            <a:pPr marL="587813" lvl="1" indent="0">
+              <a:buNone/>
+            </a:pPr>
+            <a:endParaRPr lang="en-US" dirty="0">
+              <a:solidFill>
+                <a:srgbClr val="007DC3"/>
+              </a:solidFill>
+              <a:latin typeface="+mn-lt"/>
+            </a:endParaRPr>
+          </a:p>
+          <a:p>
+            <a:pPr marL="587813" lvl="1" indent="0">
+              <a:buNone/>
+            </a:pPr>
+            <a:endParaRPr lang="en-US" dirty="0">
+              <a:solidFill>
+                <a:srgbClr val="007DC3"/>
+              </a:solidFill>
+              <a:latin typeface="+mn-lt"/>
+            </a:endParaRPr>
+          </a:p>
+          <a:p>
+            <a:pPr marL="770693" lvl="1" indent="-182880"/>
+            <a:endParaRPr lang="en-US" dirty="0">
+              <a:solidFill>
+                <a:srgbClr val="007DC3"/>
+              </a:solidFill>
+              <a:latin typeface="+mn-lt"/>
+            </a:endParaRPr>
+          </a:p>
+          <a:p>
+            <a:pPr marL="770693" lvl="1" indent="-182880"/>
+            <a:endParaRPr lang="en-US" dirty="0">
+              <a:solidFill>
+                <a:srgbClr val="007DC3"/>
+              </a:solidFill>
+              <a:latin typeface="+mn-lt"/>
+            </a:endParaRPr>
+          </a:p>
+          <a:p>
+            <a:pPr marL="770693" lvl="1" indent="-182880"/>
+            <a:endParaRPr lang="en-US" dirty="0">
+              <a:solidFill>
+                <a:srgbClr val="007DC3"/>
+              </a:solidFill>
+              <a:latin typeface="+mn-lt"/>
+            </a:endParaRPr>
+          </a:p>
+          <a:p>
+            <a:pPr marL="770693" lvl="1" indent="-182880"/>
+            <a:endParaRPr lang="en-US" dirty="0">
+              <a:solidFill>
+                <a:srgbClr val="007DC3"/>
+              </a:solidFill>
+              <a:latin typeface="+mn-lt"/>
+            </a:endParaRPr>
+          </a:p>
+          <a:p>
+            <a:pPr marL="770693" lvl="1" indent="-182880"/>
+            <a:endParaRPr lang="en-US" dirty="0">
+              <a:solidFill>
+                <a:srgbClr val="007DC3"/>
+              </a:solidFill>
+              <a:latin typeface="+mn-lt"/>
+            </a:endParaRPr>
+          </a:p>
+          <a:p>
+            <a:pPr marL="770693" lvl="1" indent="-182880"/>
+            <a:endParaRPr lang="en-US" dirty="0">
+              <a:solidFill>
+                <a:srgbClr val="007DC3"/>
+              </a:solidFill>
+              <a:latin typeface="+mn-lt"/>
+            </a:endParaRPr>
+          </a:p>
+          <a:p>
+            <a:pPr marL="770693" lvl="1" indent="-182880"/>
+            <a:endParaRPr lang="en-US" dirty="0">
+              <a:solidFill>
+                <a:srgbClr val="007DC3"/>
+              </a:solidFill>
+              <a:latin typeface="+mn-lt"/>
+            </a:endParaRPr>
+          </a:p>
+          <a:p>
+            <a:pPr marL="770693" lvl="1" indent="-182880"/>
+            <a:endParaRPr lang="en-US" dirty="0">
+              <a:solidFill>
+                <a:srgbClr val="007DC3"/>
+              </a:solidFill>
+              <a:latin typeface="+mn-lt"/>
+            </a:endParaRPr>
+          </a:p>
+          <a:p>
+            <a:pPr marL="770693" lvl="1" indent="-182880"/>
+            <a:endParaRPr lang="en-US" dirty="0">
+              <a:solidFill>
+                <a:srgbClr val="007DC3"/>
+              </a:solidFill>
+              <a:latin typeface="+mn-lt"/>
+            </a:endParaRPr>
+          </a:p>
+          <a:p>
+            <a:pPr marL="770693" lvl="1" indent="-182880"/>
+            <a:endParaRPr lang="en-US" dirty="0">
+              <a:solidFill>
+                <a:srgbClr val="007DC3"/>
+              </a:solidFill>
+              <a:latin typeface="+mn-lt"/>
+            </a:endParaRPr>
+          </a:p>
+          <a:p>
+            <a:pPr marL="770693" lvl="1" indent="-182880"/>
+            <a:endParaRPr lang="en-US" dirty="0">
+              <a:solidFill>
+                <a:srgbClr val="007DC3"/>
+              </a:solidFill>
+              <a:latin typeface="+mn-lt"/>
+            </a:endParaRPr>
+          </a:p>
+          <a:p>
+            <a:pPr marL="770693" lvl="1" indent="-182880"/>
+            <a:endParaRPr lang="en-US" dirty="0">
+              <a:solidFill>
+                <a:srgbClr val="007DC3"/>
+              </a:solidFill>
+              <a:latin typeface="+mn-lt"/>
+            </a:endParaRPr>
+          </a:p>
+          <a:p>
+            <a:pPr marL="770693" lvl="1" indent="-182880"/>
+            <a:endParaRPr lang="en-US" dirty="0">
+              <a:solidFill>
+                <a:srgbClr val="007DC3"/>
+              </a:solidFill>
+              <a:latin typeface="+mn-lt"/>
+            </a:endParaRPr>
+          </a:p>
+          <a:p>
+            <a:pPr marL="770693" lvl="1" indent="-182880"/>
+            <a:endParaRPr lang="en-US" dirty="0">
+              <a:solidFill>
+                <a:srgbClr val="007DC3"/>
+              </a:solidFill>
+              <a:latin typeface="+mn-lt"/>
+            </a:endParaRPr>
+          </a:p>
+          <a:p>
+            <a:pPr marL="770693" lvl="1" indent="-182880"/>
+            <a:endParaRPr lang="en-US" dirty="0">
+              <a:solidFill>
+                <a:srgbClr val="007DC3"/>
+              </a:solidFill>
+              <a:latin typeface="+mn-lt"/>
+            </a:endParaRPr>
+          </a:p>
+          <a:p>
+            <a:pPr marL="770693" lvl="1" indent="-182880"/>
+            <a:endParaRPr lang="en-US" dirty="0">
+              <a:solidFill>
+                <a:srgbClr val="007DC3"/>
+              </a:solidFill>
+              <a:latin typeface="+mn-lt"/>
+            </a:endParaRPr>
+          </a:p>
+          <a:p>
+            <a:pPr marL="770693" lvl="1" indent="-182880"/>
+            <a:endParaRPr lang="en-US" dirty="0">
+              <a:solidFill>
+                <a:srgbClr val="007DC3"/>
+              </a:solidFill>
+              <a:latin typeface="+mn-lt"/>
+            </a:endParaRPr>
+          </a:p>
+          <a:p>
+            <a:pPr marL="770693" lvl="1" indent="-182880"/>
+            <a:endParaRPr lang="en-US" dirty="0">
+              <a:solidFill>
+                <a:srgbClr val="007DC3"/>
+              </a:solidFill>
+              <a:latin typeface="+mn-lt"/>
+            </a:endParaRPr>
+          </a:p>
+          <a:p>
+            <a:pPr marL="770693" lvl="1" indent="-182880"/>
+            <a:endParaRPr lang="en-US" dirty="0">
+              <a:solidFill>
+                <a:srgbClr val="007DC3"/>
+              </a:solidFill>
+              <a:latin typeface="+mn-lt"/>
+            </a:endParaRPr>
+          </a:p>
+          <a:p>
+            <a:pPr marL="770693" lvl="1" indent="-182880"/>
+            <a:endParaRPr lang="en-US" dirty="0">
+              <a:solidFill>
+                <a:srgbClr val="007DC3"/>
+              </a:solidFill>
+              <a:latin typeface="+mn-lt"/>
+            </a:endParaRPr>
+          </a:p>
+          <a:p>
+            <a:pPr marL="0" indent="0">
+              <a:buNone/>
+            </a:pPr>
+            <a:endParaRPr lang="en-US" sz="1600" dirty="0">
+              <a:solidFill>
+                <a:srgbClr val="007DC3"/>
+              </a:solidFill>
+              <a:latin typeface="+mn-lt"/>
+            </a:endParaRPr>
+          </a:p>
+          <a:p>
+            <a:pPr marL="0" indent="0">
+              <a:buNone/>
+            </a:pPr>
+            <a:endParaRPr lang="en-US" sz="1600" dirty="0">
+              <a:solidFill>
+                <a:srgbClr val="007DC3"/>
+              </a:solidFill>
+              <a:latin typeface="+mn-lt"/>
+            </a:endParaRPr>
+          </a:p>
+          <a:p>
+            <a:pPr marL="0" indent="0">
+              <a:buNone/>
+            </a:pPr>
+            <a:endParaRPr lang="en-US" sz="1600" dirty="0">
+              <a:solidFill>
+                <a:srgbClr val="007DC3"/>
+              </a:solidFill>
+              <a:latin typeface="+mn-lt"/>
+            </a:endParaRPr>
+          </a:p>
+        </p:txBody>
+      </p:sp>
+      <p:pic>
+        <p:nvPicPr>
+          <p:cNvPr id="4" name="Picture 3">
+            <a:extLst>
+              <a:ext uri="{FF2B5EF4-FFF2-40B4-BE49-F238E27FC236}">
+                <a16:creationId xmlns:a16="http://schemas.microsoft.com/office/drawing/2014/main" id="{6661837B-3119-444F-A9CA-3197DD0C0DE1}"/>
+              </a:ext>
+            </a:extLst>
+          </p:cNvPr>
+          <p:cNvPicPr>
+            <a:picLocks noChangeAspect="1"/>
+          </p:cNvPicPr>
+          <p:nvPr/>
+        </p:nvPicPr>
+        <p:blipFill>
+          <a:blip r:embed="rId3">
+            <a:extLst>
+              <a:ext uri="{28A0092B-C50C-407E-A947-70E740481C1C}">
+                <a14:useLocalDpi xmlns:a14="http://schemas.microsoft.com/office/drawing/2010/main" val="0"/>
+              </a:ext>
+            </a:extLst>
+          </a:blip>
+          <a:stretch>
+            <a:fillRect/>
+          </a:stretch>
+        </p:blipFill>
+        <p:spPr>
+          <a:xfrm>
+            <a:off x="416324" y="887726"/>
+            <a:ext cx="10681167" cy="5082547"/>
+          </a:xfrm>
+          <a:prstGeom prst="rect">
+            <a:avLst/>
+          </a:prstGeom>
+        </p:spPr>
+        <p:style>
+          <a:lnRef idx="2">
+            <a:schemeClr val="dk1"/>
+          </a:lnRef>
+          <a:fillRef idx="1">
+            <a:schemeClr val="lt1"/>
+          </a:fillRef>
+          <a:effectRef idx="0">
+            <a:schemeClr val="dk1"/>
+          </a:effectRef>
+          <a:fontRef idx="minor">
+            <a:schemeClr val="dk1"/>
+          </a:fontRef>
+        </p:style>
+      </p:pic>
+    </p:spTree>
+    <p:extLst>
+      <p:ext uri="{BB962C8B-B14F-4D97-AF65-F5344CB8AC3E}">
+        <p14:creationId xmlns:p14="http://schemas.microsoft.com/office/powerpoint/2010/main" val="673954294"/>
+      </p:ext>
+    </p:extLst>
+  </p:cSld>
+  <p:clrMapOvr>
+    <a:masterClrMapping/>
+  </p:clrMapOvr>
+  <p:transition spd="med"/>
+</p:sld>
+</file>
+
+<file path=ppt/slides/slide21.xml><?xml version="1.0" encoding="utf-8"?>
+<p:sld xmlns:a="http://schemas.openxmlformats.org/drawingml/2006/main" xmlns:r="http://schemas.openxmlformats.org/officeDocument/2006/relationships" xmlns:p="http://schemas.openxmlformats.org/presentationml/2006/main">
+  <p:cSld>
+    <p:spTree>
+      <p:nvGrpSpPr>
+        <p:cNvPr id="1" name=""/>
+        <p:cNvGrpSpPr/>
+        <p:nvPr/>
+      </p:nvGrpSpPr>
+      <p:grpSpPr>
+        <a:xfrm>
+          <a:off x="0" y="0"/>
+          <a:ext cx="0" cy="0"/>
+          <a:chOff x="0" y="0"/>
+          <a:chExt cx="0" cy="0"/>
+        </a:xfrm>
+      </p:grpSpPr>
+      <p:sp>
+        <p:nvSpPr>
+          <p:cNvPr id="374" name="Shape 374"/>
+          <p:cNvSpPr>
+            <a:spLocks noGrp="1"/>
+          </p:cNvSpPr>
+          <p:nvPr>
+            <p:ph type="title"/>
+          </p:nvPr>
+        </p:nvSpPr>
         <p:spPr/>
         <p:txBody>
           <a:bodyPr/>
@@ -21114,7 +21698,7 @@
 </p:sld>
 </file>
 
-<file path=ppt/slides/slide21.xml><?xml version="1.0" encoding="utf-8"?>
+<file path=ppt/slides/slide22.xml><?xml version="1.0" encoding="utf-8"?>
 <p:sld xmlns:a="http://schemas.openxmlformats.org/drawingml/2006/main" xmlns:r="http://schemas.openxmlformats.org/officeDocument/2006/relationships" xmlns:p="http://schemas.openxmlformats.org/presentationml/2006/main">
   <p:cSld>
     <p:spTree>
@@ -21494,7 +22078,7 @@
 </p:sld>
 </file>
 
-<file path=ppt/slides/slide22.xml><?xml version="1.0" encoding="utf-8"?>
+<file path=ppt/slides/slide23.xml><?xml version="1.0" encoding="utf-8"?>
 <p:sld xmlns:a="http://schemas.openxmlformats.org/drawingml/2006/main" xmlns:r="http://schemas.openxmlformats.org/officeDocument/2006/relationships" xmlns:p="http://schemas.openxmlformats.org/presentationml/2006/main">
   <p:cSld>
     <p:spTree>
@@ -22176,7 +22760,7 @@
 </p:sld>
 </file>
 
-<file path=ppt/slides/slide23.xml><?xml version="1.0" encoding="utf-8"?>
+<file path=ppt/slides/slide24.xml><?xml version="1.0" encoding="utf-8"?>
 <p:sld xmlns:a="http://schemas.openxmlformats.org/drawingml/2006/main" xmlns:r="http://schemas.openxmlformats.org/officeDocument/2006/relationships" xmlns:p="http://schemas.openxmlformats.org/presentationml/2006/main">
   <p:cSld>
     <p:spTree>
@@ -22664,7 +23248,7 @@
 </p:sld>
 </file>
 
-<file path=ppt/slides/slide24.xml><?xml version="1.0" encoding="utf-8"?>
+<file path=ppt/slides/slide25.xml><?xml version="1.0" encoding="utf-8"?>
 <p:sld xmlns:a="http://schemas.openxmlformats.org/drawingml/2006/main" xmlns:r="http://schemas.openxmlformats.org/officeDocument/2006/relationships" xmlns:p="http://schemas.openxmlformats.org/presentationml/2006/main">
   <p:cSld>
     <p:spTree>
@@ -22805,14 +23389,14 @@
           <p:nvPr>
             <p:extLst>
               <p:ext uri="{D42A27DB-BD31-4B8C-83A1-F6EECF244321}">
-                <p14:modId xmlns:p14="http://schemas.microsoft.com/office/powerpoint/2010/main" val="2874811045"/>
+                <p14:modId xmlns:p14="http://schemas.microsoft.com/office/powerpoint/2010/main" val="374333089"/>
               </p:ext>
             </p:extLst>
           </p:nvPr>
         </p:nvGraphicFramePr>
         <p:xfrm>
           <a:off x="280633" y="860521"/>
-          <a:ext cx="11630733" cy="3820819"/>
+          <a:ext cx="11630733" cy="4796179"/>
         </p:xfrm>
         <a:graphic>
           <a:graphicData uri="http://schemas.openxmlformats.org/drawingml/2006/table">
@@ -22999,6 +23583,64 @@
                           <a:cs typeface="Arial" panose="020B0604020202020204" pitchFamily="34" charset="0"/>
                         </a:rPr>
                         <a:t> with external services. Here are a few examples of external services - Trainings, Course, Lex, Outlook, Jira etc. adapter API can pull tasks from Jira. We will provide a basic API for this function.</a:t>
+                      </a:r>
+                    </a:p>
+                    <a:p>
+                      <a:endParaRPr lang="en-US" sz="1600" dirty="0">
+                        <a:latin typeface="Arial" panose="020B0604020202020204" pitchFamily="34" charset="0"/>
+                        <a:cs typeface="Arial" panose="020B0604020202020204" pitchFamily="34" charset="0"/>
+                      </a:endParaRPr>
+                    </a:p>
+                    <a:p>
+                      <a:pPr marL="0" marR="0" lvl="0" indent="0" algn="l" defTabSz="914400" rtl="0" eaLnBrk="1" fontAlgn="auto" latinLnBrk="0" hangingPunct="1">
+                        <a:lnSpc>
+                          <a:spcPct val="100000"/>
+                        </a:lnSpc>
+                        <a:spcBef>
+                          <a:spcPts val="0"/>
+                        </a:spcBef>
+                        <a:spcAft>
+                          <a:spcPts val="0"/>
+                        </a:spcAft>
+                        <a:buClrTx/>
+                        <a:buSzTx/>
+                        <a:buFontTx/>
+                        <a:buNone/>
+                        <a:tabLst/>
+                        <a:defRPr/>
+                      </a:pPr>
+                      <a:r>
+                        <a:rPr lang="en-US" sz="1600" kern="1200" dirty="0">
+                          <a:solidFill>
+                            <a:schemeClr val="dk1"/>
+                          </a:solidFill>
+                          <a:latin typeface="Arial" panose="020B0604020202020204" pitchFamily="34" charset="0"/>
+                          <a:ea typeface="+mn-ea"/>
+                          <a:cs typeface="Arial" panose="020B0604020202020204" pitchFamily="34" charset="0"/>
+                        </a:rPr>
+                        <a:t>The </a:t>
+                      </a:r>
+                      <a:r>
+                        <a:rPr lang="en-US" sz="1600" b="1" kern="1200" dirty="0">
+                          <a:solidFill>
+                            <a:schemeClr val="dk1"/>
+                          </a:solidFill>
+                          <a:latin typeface="Arial" panose="020B0604020202020204" pitchFamily="34" charset="0"/>
+                          <a:ea typeface="+mn-ea"/>
+                          <a:cs typeface="Arial" panose="020B0604020202020204" pitchFamily="34" charset="0"/>
+                        </a:rPr>
+                        <a:t>Jira REST API </a:t>
+                      </a:r>
+                      <a:r>
+                        <a:rPr lang="en-US" sz="1600" kern="1200" dirty="0">
+                          <a:solidFill>
+                            <a:schemeClr val="dk1"/>
+                          </a:solidFill>
+                          <a:latin typeface="Arial" panose="020B0604020202020204" pitchFamily="34" charset="0"/>
+                          <a:ea typeface="+mn-ea"/>
+                          <a:cs typeface="Arial" panose="020B0604020202020204" pitchFamily="34" charset="0"/>
+                        </a:rPr>
+                        <a:t>can be invoked to push the data either sprint level or project level or task completion to iCount under specific goals or under additional documents in goals are not matching.</a:t>
                       </a:r>
                     </a:p>
                   </a:txBody>
@@ -24083,7 +24725,7 @@
           <p:nvPr>
             <p:extLst>
               <p:ext uri="{D42A27DB-BD31-4B8C-83A1-F6EECF244321}">
-                <p14:modId xmlns:p14="http://schemas.microsoft.com/office/powerpoint/2010/main" val="1944688482"/>
+                <p14:modId xmlns:p14="http://schemas.microsoft.com/office/powerpoint/2010/main" val="3525420067"/>
               </p:ext>
             </p:extLst>
           </p:nvPr>
@@ -24326,6 +24968,13 @@
                     <a:bodyPr/>
                     <a:lstStyle/>
                     <a:p>
+                      <a:r>
+                        <a:rPr lang="en-US" sz="1600">
+                          <a:latin typeface="Arial" panose="020B0604020202020204" pitchFamily="34" charset="0"/>
+                          <a:cs typeface="Arial" panose="020B0604020202020204" pitchFamily="34" charset="0"/>
+                        </a:rPr>
+                        <a:t>Employee</a:t>
+                      </a:r>
                       <a:endParaRPr lang="en-US" sz="1600" dirty="0">
                         <a:latin typeface="Arial" panose="020B0604020202020204" pitchFamily="34" charset="0"/>
                         <a:cs typeface="Arial" panose="020B0604020202020204" pitchFamily="34" charset="0"/>
@@ -25521,36 +26170,6 @@
           </a:p>
         </p:txBody>
       </p:sp>
-      <p:sp>
-        <p:nvSpPr>
-          <p:cNvPr id="6" name="Text Placeholder 5">
-            <a:extLst>
-              <a:ext uri="{FF2B5EF4-FFF2-40B4-BE49-F238E27FC236}">
-                <a16:creationId xmlns:a16="http://schemas.microsoft.com/office/drawing/2014/main" id="{4764698F-41E6-4214-BA2D-E732F41D8671}"/>
-              </a:ext>
-            </a:extLst>
-          </p:cNvPr>
-          <p:cNvSpPr>
-            <a:spLocks noGrp="1"/>
-          </p:cNvSpPr>
-          <p:nvPr>
-            <p:ph type="body" sz="quarter" idx="10"/>
-          </p:nvPr>
-        </p:nvSpPr>
-        <p:spPr>
-          <a:xfrm>
-            <a:off x="263925" y="506438"/>
-            <a:ext cx="11229263" cy="5353728"/>
-          </a:xfrm>
-        </p:spPr>
-        <p:txBody>
-          <a:bodyPr/>
-          <a:lstStyle/>
-          <a:p>
-            <a:endParaRPr lang="en-US" dirty="0"/>
-          </a:p>
-        </p:txBody>
-      </p:sp>
       <p:graphicFrame>
         <p:nvGraphicFramePr>
           <p:cNvPr id="8" name="Table 7">
@@ -25890,6 +26509,48 @@
           </a:graphicData>
         </a:graphic>
       </p:graphicFrame>
+      <p:sp>
+        <p:nvSpPr>
+          <p:cNvPr id="2" name="TextBox 1">
+            <a:extLst>
+              <a:ext uri="{FF2B5EF4-FFF2-40B4-BE49-F238E27FC236}">
+                <a16:creationId xmlns:a16="http://schemas.microsoft.com/office/drawing/2014/main" id="{E7C9586B-A96F-4A6B-A182-AE8CF6E4001A}"/>
+              </a:ext>
+            </a:extLst>
+          </p:cNvPr>
+          <p:cNvSpPr txBox="1"/>
+          <p:nvPr/>
+        </p:nvSpPr>
+        <p:spPr>
+          <a:xfrm>
+            <a:off x="315550" y="4473526"/>
+            <a:ext cx="11630732" cy="923330"/>
+          </a:xfrm>
+          <a:prstGeom prst="rect">
+            <a:avLst/>
+          </a:prstGeom>
+          <a:noFill/>
+        </p:spPr>
+        <p:txBody>
+          <a:bodyPr wrap="square" rtlCol="0">
+            <a:spAutoFit/>
+          </a:bodyPr>
+          <a:lstStyle/>
+          <a:p>
+            <a:r>
+              <a:rPr lang="en-US" dirty="0">
+                <a:highlight>
+                  <a:srgbClr val="FFFF00"/>
+                </a:highlight>
+              </a:rPr>
+              <a:t>Please note that this application to targeted to all the employees of the company. An option is also provided to exempt the employees to whom it is not applicable ( Ex: Subcons, Consultants etc...)</a:t>
+            </a:r>
+          </a:p>
+          <a:p>
+            <a:endParaRPr lang="en-US" dirty="0"/>
+          </a:p>
+        </p:txBody>
+      </p:sp>
     </p:spTree>
     <p:extLst>
       <p:ext uri="{BB962C8B-B14F-4D97-AF65-F5344CB8AC3E}">

</xml_diff>